<commit_message>
Modificação e continuação dos slides
</commit_message>
<xml_diff>
--- a/Slides/Apresentação_slide.pptx
+++ b/Slides/Apresentação_slide.pptx
@@ -8,10 +8,11 @@
     <p:sldId id="259" r:id="rId2"/>
     <p:sldId id="258" r:id="rId3"/>
     <p:sldId id="262" r:id="rId4"/>
-    <p:sldId id="263" r:id="rId5"/>
-    <p:sldId id="260" r:id="rId6"/>
-    <p:sldId id="264" r:id="rId7"/>
-    <p:sldId id="261" r:id="rId8"/>
+    <p:sldId id="265" r:id="rId5"/>
+    <p:sldId id="263" r:id="rId6"/>
+    <p:sldId id="260" r:id="rId7"/>
+    <p:sldId id="264" r:id="rId8"/>
+    <p:sldId id="261" r:id="rId9"/>
   </p:sldIdLst>
   <p:sldSz cx="12192000" cy="6858000"/>
   <p:notesSz cx="6858000" cy="9144000"/>
@@ -110,6 +111,11 @@
       </a:defRPr>
     </a:lvl9pPr>
   </p:defaultTextStyle>
+  <p:extLst>
+    <p:ext uri="{EFAFB233-063F-42B5-8137-9DF3F51BA10A}">
+      <p15:sldGuideLst xmlns:p15="http://schemas.microsoft.com/office/powerpoint/2012/main"/>
+    </p:ext>
+  </p:extLst>
 </p:presentation>
 </file>
 
@@ -3315,7 +3321,7 @@
                 <a:latin typeface="Roboto Thin" panose="02000000000000000000" pitchFamily="2" charset="0"/>
                 <a:ea typeface="Roboto Thin" panose="02000000000000000000" pitchFamily="2" charset="0"/>
               </a:rPr>
-              <a:t>Introdução – Banco de dados</a:t>
+              <a:t>NullBank</a:t>
             </a:r>
             <a:endParaRPr lang="pt-BR" dirty="0">
               <a:solidFill>
@@ -3327,25 +3333,222 @@
           </a:p>
         </p:txBody>
       </p:sp>
-      <p:sp>
-        <p:nvSpPr>
-          <p:cNvPr id="3" name="Espaço Reservado para Conteúdo 2"/>
-          <p:cNvSpPr>
-            <a:spLocks noGrp="1"/>
-          </p:cNvSpPr>
+      <p:pic>
+        <p:nvPicPr>
+          <p:cNvPr id="4" name="Espaço Reservado para Conteúdo 3"/>
+          <p:cNvPicPr>
+            <a:picLocks noGrp="1" noChangeAspect="1"/>
+          </p:cNvPicPr>
           <p:nvPr>
             <p:ph idx="1"/>
           </p:nvPr>
-        </p:nvSpPr>
-        <p:spPr/>
-        <p:txBody>
-          <a:bodyPr/>
-          <a:lstStyle/>
-          <a:p>
-            <a:pPr marL="0" indent="0">
-              <a:buNone/>
+        </p:nvPicPr>
+        <p:blipFill>
+          <a:blip r:embed="rId2" cstate="print">
+            <a:extLst>
+              <a:ext uri="{28A0092B-C50C-407E-A947-70E740481C1C}">
+                <a14:useLocalDpi xmlns:a14="http://schemas.microsoft.com/office/drawing/2010/main" val="0"/>
+              </a:ext>
+            </a:extLst>
+          </a:blip>
+          <a:stretch>
+            <a:fillRect/>
+          </a:stretch>
+        </p:blipFill>
+        <p:spPr>
+          <a:xfrm>
+            <a:off x="1370313" y="1878126"/>
+            <a:ext cx="2068345" cy="2068345"/>
+          </a:xfrm>
+        </p:spPr>
+      </p:pic>
+      <p:sp>
+        <p:nvSpPr>
+          <p:cNvPr id="5" name="CaixaDeTexto 4"/>
+          <p:cNvSpPr txBox="1"/>
+          <p:nvPr/>
+        </p:nvSpPr>
+        <p:spPr>
+          <a:xfrm>
+            <a:off x="1054781" y="4332621"/>
+            <a:ext cx="2699410" cy="461665"/>
+          </a:xfrm>
+          <a:prstGeom prst="rect">
+            <a:avLst/>
+          </a:prstGeom>
+          <a:noFill/>
+        </p:spPr>
+        <p:txBody>
+          <a:bodyPr wrap="square" rtlCol="0">
+            <a:spAutoFit/>
+          </a:bodyPr>
+          <a:lstStyle/>
+          <a:p>
+            <a:r>
+              <a:rPr lang="pt-BR" sz="2400" dirty="0" smtClean="0">
+                <a:latin typeface="Roboto Thin" panose="02000000000000000000" pitchFamily="2" charset="0"/>
+                <a:ea typeface="Roboto Thin" panose="02000000000000000000" pitchFamily="2" charset="0"/>
+              </a:rPr>
+              <a:t>Sistema bancário</a:t>
+            </a:r>
+            <a:r>
+              <a:rPr lang="pt-BR" dirty="0" smtClean="0">
+                <a:latin typeface="Roboto Thin" panose="02000000000000000000" pitchFamily="2" charset="0"/>
+                <a:ea typeface="Roboto Thin" panose="02000000000000000000" pitchFamily="2" charset="0"/>
+              </a:rPr>
+              <a:t>.</a:t>
+            </a:r>
+            <a:endParaRPr lang="pt-BR" dirty="0">
+              <a:latin typeface="Roboto Thin" panose="02000000000000000000" pitchFamily="2" charset="0"/>
+              <a:ea typeface="Roboto Thin" panose="02000000000000000000" pitchFamily="2" charset="0"/>
+            </a:endParaRPr>
+          </a:p>
+        </p:txBody>
+      </p:sp>
+      <p:sp>
+        <p:nvSpPr>
+          <p:cNvPr id="6" name="CaixaDeTexto 5"/>
+          <p:cNvSpPr txBox="1"/>
+          <p:nvPr/>
+        </p:nvSpPr>
+        <p:spPr>
+          <a:xfrm>
+            <a:off x="4417455" y="1878126"/>
+            <a:ext cx="6941711" cy="3416320"/>
+          </a:xfrm>
+          <a:prstGeom prst="rect">
+            <a:avLst/>
+          </a:prstGeom>
+          <a:noFill/>
+        </p:spPr>
+        <p:txBody>
+          <a:bodyPr wrap="square" rtlCol="0">
+            <a:spAutoFit/>
+          </a:bodyPr>
+          <a:lstStyle/>
+          <a:p>
+            <a:r>
+              <a:rPr lang="pt-BR" sz="2400" dirty="0" smtClean="0">
+                <a:solidFill>
+                  <a:srgbClr val="001173"/>
+                </a:solidFill>
+                <a:latin typeface="Roboto Thin" panose="02000000000000000000" pitchFamily="2" charset="0"/>
+                <a:ea typeface="Roboto Thin" panose="02000000000000000000" pitchFamily="2" charset="0"/>
+              </a:rPr>
+              <a:t>Funcionalidades:</a:t>
+            </a:r>
+          </a:p>
+          <a:p>
+            <a:endParaRPr lang="pt-BR" sz="2400" dirty="0" smtClean="0">
+              <a:solidFill>
+                <a:srgbClr val="001173"/>
+              </a:solidFill>
+              <a:latin typeface="Roboto Thin" panose="02000000000000000000" pitchFamily="2" charset="0"/>
+              <a:ea typeface="Roboto Thin" panose="02000000000000000000" pitchFamily="2" charset="0"/>
+            </a:endParaRPr>
+          </a:p>
+          <a:p>
+            <a:pPr marL="342900" indent="-342900">
+              <a:buClr>
+                <a:srgbClr val="007EA6"/>
+              </a:buClr>
+              <a:buFont typeface="Arial" panose="020B0604020202020204" pitchFamily="34" charset="0"/>
+              <a:buChar char="•"/>
             </a:pPr>
-            <a:endParaRPr lang="pt-BR" dirty="0" smtClean="0">
+            <a:r>
+              <a:rPr lang="pt-BR" sz="2400" dirty="0" smtClean="0">
+                <a:latin typeface="Roboto Thin" panose="02000000000000000000" pitchFamily="2" charset="0"/>
+                <a:ea typeface="Roboto Thin" panose="02000000000000000000" pitchFamily="2" charset="0"/>
+              </a:rPr>
+              <a:t>Sistema voltado para agências bancárias;</a:t>
+            </a:r>
+          </a:p>
+          <a:p>
+            <a:pPr marL="342900" indent="-342900">
+              <a:buClr>
+                <a:srgbClr val="007EA6"/>
+              </a:buClr>
+              <a:buFont typeface="Arial" panose="020B0604020202020204" pitchFamily="34" charset="0"/>
+              <a:buChar char="•"/>
+            </a:pPr>
+            <a:r>
+              <a:rPr lang="pt-BR" sz="2400" dirty="0">
+                <a:solidFill>
+                  <a:srgbClr val="001173"/>
+                </a:solidFill>
+                <a:latin typeface="Roboto Thin" panose="02000000000000000000" pitchFamily="2" charset="0"/>
+                <a:ea typeface="Roboto Thin" panose="02000000000000000000" pitchFamily="2" charset="0"/>
+              </a:rPr>
+              <a:t> </a:t>
+            </a:r>
+            <a:r>
+              <a:rPr lang="pt-BR" sz="2400" dirty="0" smtClean="0">
+                <a:latin typeface="Roboto Thin" panose="02000000000000000000" pitchFamily="2" charset="0"/>
+                <a:ea typeface="Roboto Thin" panose="02000000000000000000" pitchFamily="2" charset="0"/>
+              </a:rPr>
+              <a:t>Controle de informações: clientes, funcionários e agências;</a:t>
+            </a:r>
+          </a:p>
+          <a:p>
+            <a:pPr marL="342900" indent="-342900">
+              <a:buClr>
+                <a:srgbClr val="007EA6"/>
+              </a:buClr>
+              <a:buFont typeface="Arial" panose="020B0604020202020204" pitchFamily="34" charset="0"/>
+              <a:buChar char="•"/>
+            </a:pPr>
+            <a:r>
+              <a:rPr lang="pt-BR" sz="2400" dirty="0" smtClean="0">
+                <a:latin typeface="Roboto Thin" panose="02000000000000000000" pitchFamily="2" charset="0"/>
+                <a:ea typeface="Roboto Thin" panose="02000000000000000000" pitchFamily="2" charset="0"/>
+              </a:rPr>
+              <a:t> Realização de consultas;</a:t>
+            </a:r>
+          </a:p>
+          <a:p>
+            <a:pPr marL="342900" indent="-342900">
+              <a:buClr>
+                <a:srgbClr val="007EA6"/>
+              </a:buClr>
+              <a:buFont typeface="Arial" panose="020B0604020202020204" pitchFamily="34" charset="0"/>
+              <a:buChar char="•"/>
+            </a:pPr>
+            <a:r>
+              <a:rPr lang="pt-BR" sz="2400" dirty="0" smtClean="0">
+                <a:latin typeface="Roboto Thin" panose="02000000000000000000" pitchFamily="2" charset="0"/>
+                <a:ea typeface="Roboto Thin" panose="02000000000000000000" pitchFamily="2" charset="0"/>
+              </a:rPr>
+              <a:t> Realização de transações.</a:t>
+            </a:r>
+          </a:p>
+          <a:p>
+            <a:pPr marL="342900" indent="-342900">
+              <a:buClr>
+                <a:srgbClr val="007EA6"/>
+              </a:buClr>
+              <a:buFont typeface="Arial" panose="020B0604020202020204" pitchFamily="34" charset="0"/>
+              <a:buChar char="•"/>
+            </a:pPr>
+            <a:endParaRPr lang="pt-BR" sz="2400" dirty="0" smtClean="0">
+              <a:solidFill>
+                <a:srgbClr val="001173"/>
+              </a:solidFill>
+              <a:latin typeface="Roboto Thin" panose="02000000000000000000" pitchFamily="2" charset="0"/>
+              <a:ea typeface="Roboto Thin" panose="02000000000000000000" pitchFamily="2" charset="0"/>
+            </a:endParaRPr>
+          </a:p>
+          <a:p>
+            <a:pPr marL="342900" indent="-342900">
+              <a:buClr>
+                <a:srgbClr val="007EA6"/>
+              </a:buClr>
+              <a:buFont typeface="Arial" panose="020B0604020202020204" pitchFamily="34" charset="0"/>
+              <a:buChar char="•"/>
+            </a:pPr>
+            <a:endParaRPr lang="pt-BR" sz="2400" dirty="0">
+              <a:solidFill>
+                <a:srgbClr val="001173"/>
+              </a:solidFill>
               <a:latin typeface="Roboto Thin" panose="02000000000000000000" pitchFamily="2" charset="0"/>
               <a:ea typeface="Roboto Thin" panose="02000000000000000000" pitchFamily="2" charset="0"/>
             </a:endParaRPr>
@@ -3373,6 +3576,225 @@
 </file>
 
 <file path=ppt/slides/slide4.xml><?xml version="1.0" encoding="utf-8"?>
+<p:sld xmlns:a="http://schemas.openxmlformats.org/drawingml/2006/main" xmlns:r="http://schemas.openxmlformats.org/officeDocument/2006/relationships" xmlns:p="http://schemas.openxmlformats.org/presentationml/2006/main">
+  <p:cSld>
+    <p:spTree>
+      <p:nvGrpSpPr>
+        <p:cNvPr id="1" name=""/>
+        <p:cNvGrpSpPr/>
+        <p:nvPr/>
+      </p:nvGrpSpPr>
+      <p:grpSpPr>
+        <a:xfrm>
+          <a:off x="0" y="0"/>
+          <a:ext cx="0" cy="0"/>
+          <a:chOff x="0" y="0"/>
+          <a:chExt cx="0" cy="0"/>
+        </a:xfrm>
+      </p:grpSpPr>
+      <p:sp>
+        <p:nvSpPr>
+          <p:cNvPr id="2" name="Título 1"/>
+          <p:cNvSpPr>
+            <a:spLocks noGrp="1"/>
+          </p:cNvSpPr>
+          <p:nvPr>
+            <p:ph type="title"/>
+          </p:nvPr>
+        </p:nvSpPr>
+        <p:spPr>
+          <a:xfrm>
+            <a:off x="0" y="1"/>
+            <a:ext cx="12192000" cy="1030310"/>
+          </a:xfrm>
+          <a:solidFill>
+            <a:srgbClr val="007EA6"/>
+          </a:solidFill>
+        </p:spPr>
+        <p:txBody>
+          <a:bodyPr/>
+          <a:lstStyle/>
+          <a:p>
+            <a:r>
+              <a:rPr lang="pt-BR" dirty="0" smtClean="0">
+                <a:solidFill>
+                  <a:schemeClr val="bg1"/>
+                </a:solidFill>
+                <a:latin typeface="Roboto Thin" panose="02000000000000000000" pitchFamily="2" charset="0"/>
+                <a:ea typeface="Roboto Thin" panose="02000000000000000000" pitchFamily="2" charset="0"/>
+              </a:rPr>
+              <a:t>NullBank</a:t>
+            </a:r>
+            <a:endParaRPr lang="pt-BR" dirty="0">
+              <a:solidFill>
+                <a:schemeClr val="bg1"/>
+              </a:solidFill>
+              <a:latin typeface="Roboto Thin" panose="02000000000000000000" pitchFamily="2" charset="0"/>
+              <a:ea typeface="Roboto Thin" panose="02000000000000000000" pitchFamily="2" charset="0"/>
+            </a:endParaRPr>
+          </a:p>
+        </p:txBody>
+      </p:sp>
+      <p:sp>
+        <p:nvSpPr>
+          <p:cNvPr id="5" name="CaixaDeTexto 4"/>
+          <p:cNvSpPr txBox="1"/>
+          <p:nvPr/>
+        </p:nvSpPr>
+        <p:spPr>
+          <a:xfrm>
+            <a:off x="1054781" y="4332621"/>
+            <a:ext cx="2699410" cy="461665"/>
+          </a:xfrm>
+          <a:prstGeom prst="rect">
+            <a:avLst/>
+          </a:prstGeom>
+          <a:noFill/>
+        </p:spPr>
+        <p:txBody>
+          <a:bodyPr wrap="square" rtlCol="0">
+            <a:spAutoFit/>
+          </a:bodyPr>
+          <a:lstStyle/>
+          <a:p>
+            <a:r>
+              <a:rPr lang="pt-BR" sz="2400" dirty="0" smtClean="0">
+                <a:latin typeface="Roboto Thin" panose="02000000000000000000" pitchFamily="2" charset="0"/>
+                <a:ea typeface="Roboto Thin" panose="02000000000000000000" pitchFamily="2" charset="0"/>
+              </a:rPr>
+              <a:t>Sistema bancário</a:t>
+            </a:r>
+            <a:r>
+              <a:rPr lang="pt-BR" dirty="0" smtClean="0">
+                <a:latin typeface="Roboto Thin" panose="02000000000000000000" pitchFamily="2" charset="0"/>
+                <a:ea typeface="Roboto Thin" panose="02000000000000000000" pitchFamily="2" charset="0"/>
+              </a:rPr>
+              <a:t>.</a:t>
+            </a:r>
+            <a:endParaRPr lang="pt-BR" dirty="0">
+              <a:latin typeface="Roboto Thin" panose="02000000000000000000" pitchFamily="2" charset="0"/>
+              <a:ea typeface="Roboto Thin" panose="02000000000000000000" pitchFamily="2" charset="0"/>
+            </a:endParaRPr>
+          </a:p>
+        </p:txBody>
+      </p:sp>
+      <p:sp>
+        <p:nvSpPr>
+          <p:cNvPr id="6" name="CaixaDeTexto 5"/>
+          <p:cNvSpPr txBox="1"/>
+          <p:nvPr/>
+        </p:nvSpPr>
+        <p:spPr>
+          <a:xfrm>
+            <a:off x="4417455" y="1878126"/>
+            <a:ext cx="6941711" cy="830997"/>
+          </a:xfrm>
+          <a:prstGeom prst="rect">
+            <a:avLst/>
+          </a:prstGeom>
+          <a:noFill/>
+        </p:spPr>
+        <p:txBody>
+          <a:bodyPr wrap="square" rtlCol="0">
+            <a:spAutoFit/>
+          </a:bodyPr>
+          <a:lstStyle/>
+          <a:p>
+            <a:pPr marL="342900" indent="-342900">
+              <a:buClr>
+                <a:srgbClr val="007EA6"/>
+              </a:buClr>
+              <a:buFont typeface="Arial" panose="020B0604020202020204" pitchFamily="34" charset="0"/>
+              <a:buChar char="•"/>
+            </a:pPr>
+            <a:endParaRPr lang="pt-BR" sz="2400" dirty="0" smtClean="0">
+              <a:solidFill>
+                <a:srgbClr val="001173"/>
+              </a:solidFill>
+              <a:latin typeface="Roboto Thin" panose="02000000000000000000" pitchFamily="2" charset="0"/>
+              <a:ea typeface="Roboto Thin" panose="02000000000000000000" pitchFamily="2" charset="0"/>
+            </a:endParaRPr>
+          </a:p>
+          <a:p>
+            <a:pPr marL="342900" indent="-342900">
+              <a:buClr>
+                <a:srgbClr val="007EA6"/>
+              </a:buClr>
+              <a:buFont typeface="Arial" panose="020B0604020202020204" pitchFamily="34" charset="0"/>
+              <a:buChar char="•"/>
+            </a:pPr>
+            <a:endParaRPr lang="pt-BR" sz="2400" dirty="0">
+              <a:solidFill>
+                <a:srgbClr val="001173"/>
+              </a:solidFill>
+              <a:latin typeface="Roboto Thin" panose="02000000000000000000" pitchFamily="2" charset="0"/>
+              <a:ea typeface="Roboto Thin" panose="02000000000000000000" pitchFamily="2" charset="0"/>
+            </a:endParaRPr>
+          </a:p>
+        </p:txBody>
+      </p:sp>
+      <p:sp>
+        <p:nvSpPr>
+          <p:cNvPr id="3" name="Espaço Reservado para Conteúdo 2"/>
+          <p:cNvSpPr>
+            <a:spLocks noGrp="1"/>
+          </p:cNvSpPr>
+          <p:nvPr>
+            <p:ph idx="1"/>
+          </p:nvPr>
+        </p:nvSpPr>
+        <p:spPr/>
+        <p:txBody>
+          <a:bodyPr/>
+          <a:lstStyle/>
+          <a:p>
+            <a:r>
+              <a:rPr lang="pt-BR" dirty="0" smtClean="0"/>
+              <a:t>Aqui será inserido </a:t>
+            </a:r>
+            <a:r>
+              <a:rPr lang="pt-BR" dirty="0" err="1" smtClean="0"/>
+              <a:t>prints</a:t>
+            </a:r>
+            <a:r>
+              <a:rPr lang="pt-BR" dirty="0" smtClean="0"/>
+              <a:t> das telas</a:t>
+            </a:r>
+          </a:p>
+          <a:p>
+            <a:r>
+              <a:rPr lang="pt-BR" dirty="0" smtClean="0"/>
+              <a:t>Aqui e nos </a:t>
+            </a:r>
+            <a:r>
+              <a:rPr lang="pt-BR" smtClean="0"/>
+              <a:t>próximo slides.</a:t>
+            </a:r>
+            <a:endParaRPr lang="pt-BR" dirty="0"/>
+          </a:p>
+        </p:txBody>
+      </p:sp>
+    </p:spTree>
+    <p:extLst>
+      <p:ext uri="{BB962C8B-B14F-4D97-AF65-F5344CB8AC3E}">
+        <p14:creationId xmlns:p14="http://schemas.microsoft.com/office/powerpoint/2010/main" val="1659387329"/>
+      </p:ext>
+    </p:extLst>
+  </p:cSld>
+  <p:clrMapOvr>
+    <a:masterClrMapping/>
+  </p:clrMapOvr>
+  <p:timing>
+    <p:tnLst>
+      <p:par>
+        <p:cTn id="1" dur="indefinite" restart="never" nodeType="tmRoot"/>
+      </p:par>
+    </p:tnLst>
+  </p:timing>
+</p:sld>
+</file>
+
+<file path=ppt/slides/slide5.xml><?xml version="1.0" encoding="utf-8"?>
 <p:sld xmlns:a="http://schemas.openxmlformats.org/drawingml/2006/main" xmlns:r="http://schemas.openxmlformats.org/officeDocument/2006/relationships" xmlns:p="http://schemas.openxmlformats.org/presentationml/2006/main">
   <p:cSld>
     <p:spTree>
@@ -3487,7 +3909,7 @@
 </p:sld>
 </file>
 
-<file path=ppt/slides/slide5.xml><?xml version="1.0" encoding="utf-8"?>
+<file path=ppt/slides/slide6.xml><?xml version="1.0" encoding="utf-8"?>
 <p:sld xmlns:a="http://schemas.openxmlformats.org/drawingml/2006/main" xmlns:r="http://schemas.openxmlformats.org/officeDocument/2006/relationships" xmlns:p="http://schemas.openxmlformats.org/presentationml/2006/main">
   <p:cSld>
     <p:spTree>
@@ -3586,8 +4008,19 @@
                 <a:latin typeface="Roboto Thin" panose="02000000000000000000" pitchFamily="2" charset="0"/>
                 <a:ea typeface="Roboto Thin" panose="02000000000000000000" pitchFamily="2" charset="0"/>
               </a:rPr>
-              <a:t>MySQL Workbench – modelagem;</a:t>
-            </a:r>
+              <a:t>MySQL Workbench </a:t>
+            </a:r>
+            <a:r>
+              <a:rPr lang="pt-BR" dirty="0" smtClean="0">
+                <a:latin typeface="Roboto Thin" panose="02000000000000000000" pitchFamily="2" charset="0"/>
+                <a:ea typeface="Roboto Thin" panose="02000000000000000000" pitchFamily="2" charset="0"/>
+              </a:rPr>
+              <a:t> 6.3 – modelagem;</a:t>
+            </a:r>
+            <a:endParaRPr lang="pt-BR" dirty="0" smtClean="0">
+              <a:latin typeface="Roboto Thin" panose="02000000000000000000" pitchFamily="2" charset="0"/>
+              <a:ea typeface="Roboto Thin" panose="02000000000000000000" pitchFamily="2" charset="0"/>
+            </a:endParaRPr>
           </a:p>
           <a:p>
             <a:pPr lvl="1">
@@ -3636,16 +4069,12 @@
               </a:buClr>
             </a:pPr>
             <a:r>
-              <a:rPr lang="pt-BR" smtClean="0">
+              <a:rPr lang="pt-BR" dirty="0" smtClean="0">
                 <a:latin typeface="Roboto Thin" panose="02000000000000000000" pitchFamily="2" charset="0"/>
                 <a:ea typeface="Roboto Thin" panose="02000000000000000000" pitchFamily="2" charset="0"/>
               </a:rPr>
               <a:t>HTML 5;</a:t>
             </a:r>
-            <a:endParaRPr lang="pt-BR" dirty="0" smtClean="0">
-              <a:latin typeface="Roboto Thin" panose="02000000000000000000" pitchFamily="2" charset="0"/>
-              <a:ea typeface="Roboto Thin" panose="02000000000000000000" pitchFamily="2" charset="0"/>
-            </a:endParaRPr>
           </a:p>
           <a:p>
             <a:pPr lvl="1">
@@ -3660,10 +4089,6 @@
               </a:rPr>
               <a:t>CSS.</a:t>
             </a:r>
-            <a:endParaRPr lang="pt-BR" dirty="0" smtClean="0">
-              <a:latin typeface="Roboto Thin" panose="02000000000000000000" pitchFamily="2" charset="0"/>
-              <a:ea typeface="Roboto Thin" panose="02000000000000000000" pitchFamily="2" charset="0"/>
-            </a:endParaRPr>
           </a:p>
           <a:p>
             <a:pPr lvl="1">
@@ -3685,10 +4110,6 @@
               </a:rPr>
               <a:t>;</a:t>
             </a:r>
-            <a:endParaRPr lang="pt-BR" dirty="0" smtClean="0">
-              <a:latin typeface="Roboto Thin" panose="02000000000000000000" pitchFamily="2" charset="0"/>
-              <a:ea typeface="Roboto Thin" panose="02000000000000000000" pitchFamily="2" charset="0"/>
-            </a:endParaRPr>
           </a:p>
           <a:p>
             <a:pPr lvl="1">
@@ -3710,10 +4131,6 @@
               </a:rPr>
               <a:t>.</a:t>
             </a:r>
-            <a:endParaRPr lang="pt-BR" dirty="0" smtClean="0">
-              <a:latin typeface="Roboto Thin" panose="02000000000000000000" pitchFamily="2" charset="0"/>
-              <a:ea typeface="Roboto Thin" panose="02000000000000000000" pitchFamily="2" charset="0"/>
-            </a:endParaRPr>
           </a:p>
           <a:p>
             <a:pPr marL="457200" lvl="1" indent="0">
@@ -3760,7 +4177,7 @@
 </p:sld>
 </file>
 
-<file path=ppt/slides/slide6.xml><?xml version="1.0" encoding="utf-8"?>
+<file path=ppt/slides/slide7.xml><?xml version="1.0" encoding="utf-8"?>
 <p:sld xmlns:a="http://schemas.openxmlformats.org/drawingml/2006/main" xmlns:r="http://schemas.openxmlformats.org/officeDocument/2006/relationships" xmlns:p="http://schemas.openxmlformats.org/presentationml/2006/main">
   <p:cSld>
     <p:spTree>
@@ -3875,7 +4292,7 @@
 </p:sld>
 </file>
 
-<file path=ppt/slides/slide7.xml><?xml version="1.0" encoding="utf-8"?>
+<file path=ppt/slides/slide8.xml><?xml version="1.0" encoding="utf-8"?>
 <p:sld xmlns:a="http://schemas.openxmlformats.org/drawingml/2006/main" xmlns:r="http://schemas.openxmlformats.org/officeDocument/2006/relationships" xmlns:p="http://schemas.openxmlformats.org/presentationml/2006/main">
   <p:cSld>
     <p:spTree>

</xml_diff>

<commit_message>
Geração do executável final
</commit_message>
<xml_diff>
--- a/Slides/Apresentação_slide.pptx
+++ b/Slides/Apresentação_slide.pptx
@@ -8,14 +8,10 @@
     <p:sldId id="259" r:id="rId2"/>
     <p:sldId id="266" r:id="rId3"/>
     <p:sldId id="262" r:id="rId4"/>
-    <p:sldId id="265" r:id="rId5"/>
-    <p:sldId id="271" r:id="rId6"/>
-    <p:sldId id="270" r:id="rId7"/>
-    <p:sldId id="267" r:id="rId8"/>
-    <p:sldId id="260" r:id="rId9"/>
-    <p:sldId id="268" r:id="rId10"/>
-    <p:sldId id="261" r:id="rId11"/>
-    <p:sldId id="269" r:id="rId12"/>
+    <p:sldId id="267" r:id="rId5"/>
+    <p:sldId id="260" r:id="rId6"/>
+    <p:sldId id="268" r:id="rId7"/>
+    <p:sldId id="269" r:id="rId8"/>
   </p:sldIdLst>
   <p:sldSz cx="12192000" cy="6858000"/>
   <p:notesSz cx="6858000" cy="9144000"/>
@@ -267,7 +263,7 @@
           <a:p>
             <a:fld id="{6CE4B8DC-9158-4DEC-A8B9-5CF9251B7768}" type="datetimeFigureOut">
               <a:rPr lang="pt-BR" smtClean="0"/>
-              <a:t>30/11/2017</a:t>
+              <a:t>04/12/2017</a:t>
             </a:fld>
             <a:endParaRPr lang="pt-BR"/>
           </a:p>
@@ -435,7 +431,7 @@
           <a:p>
             <a:fld id="{6CE4B8DC-9158-4DEC-A8B9-5CF9251B7768}" type="datetimeFigureOut">
               <a:rPr lang="pt-BR" smtClean="0"/>
-              <a:t>30/11/2017</a:t>
+              <a:t>04/12/2017</a:t>
             </a:fld>
             <a:endParaRPr lang="pt-BR"/>
           </a:p>
@@ -613,7 +609,7 @@
           <a:p>
             <a:fld id="{6CE4B8DC-9158-4DEC-A8B9-5CF9251B7768}" type="datetimeFigureOut">
               <a:rPr lang="pt-BR" smtClean="0"/>
-              <a:t>30/11/2017</a:t>
+              <a:t>04/12/2017</a:t>
             </a:fld>
             <a:endParaRPr lang="pt-BR"/>
           </a:p>
@@ -781,7 +777,7 @@
           <a:p>
             <a:fld id="{6CE4B8DC-9158-4DEC-A8B9-5CF9251B7768}" type="datetimeFigureOut">
               <a:rPr lang="pt-BR" smtClean="0"/>
-              <a:t>30/11/2017</a:t>
+              <a:t>04/12/2017</a:t>
             </a:fld>
             <a:endParaRPr lang="pt-BR"/>
           </a:p>
@@ -1026,7 +1022,7 @@
           <a:p>
             <a:fld id="{6CE4B8DC-9158-4DEC-A8B9-5CF9251B7768}" type="datetimeFigureOut">
               <a:rPr lang="pt-BR" smtClean="0"/>
-              <a:t>30/11/2017</a:t>
+              <a:t>04/12/2017</a:t>
             </a:fld>
             <a:endParaRPr lang="pt-BR"/>
           </a:p>
@@ -1255,7 +1251,7 @@
           <a:p>
             <a:fld id="{6CE4B8DC-9158-4DEC-A8B9-5CF9251B7768}" type="datetimeFigureOut">
               <a:rPr lang="pt-BR" smtClean="0"/>
-              <a:t>30/11/2017</a:t>
+              <a:t>04/12/2017</a:t>
             </a:fld>
             <a:endParaRPr lang="pt-BR"/>
           </a:p>
@@ -1619,7 +1615,7 @@
           <a:p>
             <a:fld id="{6CE4B8DC-9158-4DEC-A8B9-5CF9251B7768}" type="datetimeFigureOut">
               <a:rPr lang="pt-BR" smtClean="0"/>
-              <a:t>30/11/2017</a:t>
+              <a:t>04/12/2017</a:t>
             </a:fld>
             <a:endParaRPr lang="pt-BR"/>
           </a:p>
@@ -1736,7 +1732,7 @@
           <a:p>
             <a:fld id="{6CE4B8DC-9158-4DEC-A8B9-5CF9251B7768}" type="datetimeFigureOut">
               <a:rPr lang="pt-BR" smtClean="0"/>
-              <a:t>30/11/2017</a:t>
+              <a:t>04/12/2017</a:t>
             </a:fld>
             <a:endParaRPr lang="pt-BR"/>
           </a:p>
@@ -1831,7 +1827,7 @@
           <a:p>
             <a:fld id="{6CE4B8DC-9158-4DEC-A8B9-5CF9251B7768}" type="datetimeFigureOut">
               <a:rPr lang="pt-BR" smtClean="0"/>
-              <a:t>30/11/2017</a:t>
+              <a:t>04/12/2017</a:t>
             </a:fld>
             <a:endParaRPr lang="pt-BR"/>
           </a:p>
@@ -2106,7 +2102,7 @@
           <a:p>
             <a:fld id="{6CE4B8DC-9158-4DEC-A8B9-5CF9251B7768}" type="datetimeFigureOut">
               <a:rPr lang="pt-BR" smtClean="0"/>
-              <a:t>30/11/2017</a:t>
+              <a:t>04/12/2017</a:t>
             </a:fld>
             <a:endParaRPr lang="pt-BR"/>
           </a:p>
@@ -2358,7 +2354,7 @@
           <a:p>
             <a:fld id="{6CE4B8DC-9158-4DEC-A8B9-5CF9251B7768}" type="datetimeFigureOut">
               <a:rPr lang="pt-BR" smtClean="0"/>
-              <a:t>30/11/2017</a:t>
+              <a:t>04/12/2017</a:t>
             </a:fld>
             <a:endParaRPr lang="pt-BR"/>
           </a:p>
@@ -2569,7 +2565,7 @@
           <a:p>
             <a:fld id="{6CE4B8DC-9158-4DEC-A8B9-5CF9251B7768}" type="datetimeFigureOut">
               <a:rPr lang="pt-BR" smtClean="0"/>
-              <a:t>30/11/2017</a:t>
+              <a:t>04/12/2017</a:t>
             </a:fld>
             <a:endParaRPr lang="pt-BR"/>
           </a:p>
@@ -3123,263 +3119,6 @@
 </p:sld>
 </file>
 
-<file path=ppt/slides/slide10.xml><?xml version="1.0" encoding="utf-8"?>
-<p:sld xmlns:a="http://schemas.openxmlformats.org/drawingml/2006/main" xmlns:r="http://schemas.openxmlformats.org/officeDocument/2006/relationships" xmlns:p="http://schemas.openxmlformats.org/presentationml/2006/main">
-  <p:cSld>
-    <p:spTree>
-      <p:nvGrpSpPr>
-        <p:cNvPr id="1" name=""/>
-        <p:cNvGrpSpPr/>
-        <p:nvPr/>
-      </p:nvGrpSpPr>
-      <p:grpSpPr>
-        <a:xfrm>
-          <a:off x="0" y="0"/>
-          <a:ext cx="0" cy="0"/>
-          <a:chOff x="0" y="0"/>
-          <a:chExt cx="0" cy="0"/>
-        </a:xfrm>
-      </p:grpSpPr>
-      <p:sp>
-        <p:nvSpPr>
-          <p:cNvPr id="2" name="Título 1"/>
-          <p:cNvSpPr>
-            <a:spLocks noGrp="1"/>
-          </p:cNvSpPr>
-          <p:nvPr>
-            <p:ph type="title"/>
-          </p:nvPr>
-        </p:nvSpPr>
-        <p:spPr>
-          <a:xfrm>
-            <a:off x="0" y="1"/>
-            <a:ext cx="12192000" cy="1030310"/>
-          </a:xfrm>
-          <a:solidFill>
-            <a:srgbClr val="007EA6"/>
-          </a:solidFill>
-        </p:spPr>
-        <p:txBody>
-          <a:bodyPr/>
-          <a:lstStyle/>
-          <a:p>
-            <a:r>
-              <a:rPr lang="pt-BR" dirty="0">
-                <a:solidFill>
-                  <a:schemeClr val="bg1"/>
-                </a:solidFill>
-                <a:latin typeface="Roboto Thin" panose="02000000000000000000" pitchFamily="2" charset="0"/>
-                <a:ea typeface="Roboto Thin" panose="02000000000000000000" pitchFamily="2" charset="0"/>
-              </a:rPr>
-              <a:t>Conclusão</a:t>
-            </a:r>
-          </a:p>
-        </p:txBody>
-      </p:sp>
-      <p:sp>
-        <p:nvSpPr>
-          <p:cNvPr id="3" name="Espaço Reservado para Conteúdo 2"/>
-          <p:cNvSpPr>
-            <a:spLocks noGrp="1"/>
-          </p:cNvSpPr>
-          <p:nvPr>
-            <p:ph idx="1"/>
-          </p:nvPr>
-        </p:nvSpPr>
-        <p:spPr/>
-        <p:txBody>
-          <a:bodyPr/>
-          <a:lstStyle/>
-          <a:p>
-            <a:pPr marL="0" indent="0">
-              <a:buNone/>
-            </a:pPr>
-            <a:endParaRPr lang="pt-BR">
-              <a:latin typeface="Roboto Thin" panose="02000000000000000000" pitchFamily="2" charset="0"/>
-              <a:ea typeface="Roboto Thin" panose="02000000000000000000" pitchFamily="2" charset="0"/>
-            </a:endParaRPr>
-          </a:p>
-        </p:txBody>
-      </p:sp>
-    </p:spTree>
-    <p:extLst>
-      <p:ext uri="{BB962C8B-B14F-4D97-AF65-F5344CB8AC3E}">
-        <p14:creationId xmlns:p14="http://schemas.microsoft.com/office/powerpoint/2010/main" val="633639850"/>
-      </p:ext>
-    </p:extLst>
-  </p:cSld>
-  <p:clrMapOvr>
-    <a:masterClrMapping/>
-  </p:clrMapOvr>
-</p:sld>
-</file>
-
-<file path=ppt/slides/slide11.xml><?xml version="1.0" encoding="utf-8"?>
-<p:sld xmlns:a="http://schemas.openxmlformats.org/drawingml/2006/main" xmlns:r="http://schemas.openxmlformats.org/officeDocument/2006/relationships" xmlns:p="http://schemas.openxmlformats.org/presentationml/2006/main">
-  <p:cSld>
-    <p:spTree>
-      <p:nvGrpSpPr>
-        <p:cNvPr id="1" name=""/>
-        <p:cNvGrpSpPr/>
-        <p:nvPr/>
-      </p:nvGrpSpPr>
-      <p:grpSpPr>
-        <a:xfrm>
-          <a:off x="0" y="0"/>
-          <a:ext cx="0" cy="0"/>
-          <a:chOff x="0" y="0"/>
-          <a:chExt cx="0" cy="0"/>
-        </a:xfrm>
-      </p:grpSpPr>
-      <p:sp>
-        <p:nvSpPr>
-          <p:cNvPr id="2" name="Título 1"/>
-          <p:cNvSpPr>
-            <a:spLocks noGrp="1"/>
-          </p:cNvSpPr>
-          <p:nvPr>
-            <p:ph type="title"/>
-          </p:nvPr>
-        </p:nvSpPr>
-        <p:spPr>
-          <a:xfrm>
-            <a:off x="0" y="1"/>
-            <a:ext cx="12192000" cy="1030310"/>
-          </a:xfrm>
-          <a:solidFill>
-            <a:srgbClr val="007EA6"/>
-          </a:solidFill>
-        </p:spPr>
-        <p:txBody>
-          <a:bodyPr/>
-          <a:lstStyle/>
-          <a:p>
-            <a:r>
-              <a:rPr lang="pt-BR" dirty="0">
-                <a:solidFill>
-                  <a:schemeClr val="bg1"/>
-                </a:solidFill>
-                <a:latin typeface="Roboto Thin" panose="02000000000000000000" pitchFamily="2" charset="0"/>
-                <a:ea typeface="Roboto Thin" panose="02000000000000000000" pitchFamily="2" charset="0"/>
-              </a:rPr>
-              <a:t>Referências</a:t>
-            </a:r>
-          </a:p>
-        </p:txBody>
-      </p:sp>
-      <p:sp>
-        <p:nvSpPr>
-          <p:cNvPr id="3" name="Espaço Reservado para Conteúdo 2"/>
-          <p:cNvSpPr>
-            <a:spLocks noGrp="1"/>
-          </p:cNvSpPr>
-          <p:nvPr>
-            <p:ph idx="1"/>
-          </p:nvPr>
-        </p:nvSpPr>
-        <p:spPr/>
-        <p:txBody>
-          <a:bodyPr/>
-          <a:lstStyle/>
-          <a:p>
-            <a:pPr>
-              <a:buClr>
-                <a:srgbClr val="001173"/>
-              </a:buClr>
-            </a:pPr>
-            <a:r>
-              <a:rPr lang="pt-BR" dirty="0">
-                <a:latin typeface="Roboto Thin" panose="02000000000000000000" pitchFamily="2" charset="0"/>
-                <a:ea typeface="Roboto Thin" panose="02000000000000000000" pitchFamily="2" charset="0"/>
-              </a:rPr>
-              <a:t>https://electronjs.org/docs/api</a:t>
-            </a:r>
-          </a:p>
-          <a:p>
-            <a:pPr>
-              <a:buClr>
-                <a:srgbClr val="001173"/>
-              </a:buClr>
-            </a:pPr>
-            <a:r>
-              <a:rPr lang="pt-BR" dirty="0">
-                <a:latin typeface="Roboto Thin" panose="02000000000000000000" pitchFamily="2" charset="0"/>
-                <a:ea typeface="Roboto Thin" panose="02000000000000000000" pitchFamily="2" charset="0"/>
-              </a:rPr>
-              <a:t>https://getbootstrap.com/docs/4.0/getting-started/introduction</a:t>
-            </a:r>
-          </a:p>
-          <a:p>
-            <a:pPr>
-              <a:buClr>
-                <a:srgbClr val="001173"/>
-              </a:buClr>
-            </a:pPr>
-            <a:r>
-              <a:rPr lang="pt-BR" dirty="0">
-                <a:latin typeface="Roboto Thin" panose="02000000000000000000" pitchFamily="2" charset="0"/>
-                <a:ea typeface="Roboto Thin" panose="02000000000000000000" pitchFamily="2" charset="0"/>
-              </a:rPr>
-              <a:t>https://www.npmjs.com/package/mysql</a:t>
-            </a:r>
-          </a:p>
-          <a:p>
-            <a:pPr>
-              <a:buClr>
-                <a:srgbClr val="001173"/>
-              </a:buClr>
-            </a:pPr>
-            <a:r>
-              <a:rPr lang="pt-BR" dirty="0">
-                <a:latin typeface="Roboto Thin" panose="02000000000000000000" pitchFamily="2" charset="0"/>
-                <a:ea typeface="Roboto Thin" panose="02000000000000000000" pitchFamily="2" charset="0"/>
-              </a:rPr>
-              <a:t>https://developer.mozilla.org/pt-BR/docs/Web/JavaScript</a:t>
-            </a:r>
-          </a:p>
-          <a:p>
-            <a:pPr>
-              <a:buClr>
-                <a:srgbClr val="001173"/>
-              </a:buClr>
-            </a:pPr>
-            <a:r>
-              <a:rPr lang="pt-BR" dirty="0">
-                <a:latin typeface="Roboto Thin" panose="02000000000000000000" pitchFamily="2" charset="0"/>
-                <a:ea typeface="Roboto Thin" panose="02000000000000000000" pitchFamily="2" charset="0"/>
-              </a:rPr>
-              <a:t>https://developer.mozilla.org/pt-BR/docs/Web/HTML</a:t>
-            </a:r>
-          </a:p>
-          <a:p>
-            <a:pPr>
-              <a:buClr>
-                <a:srgbClr val="001173"/>
-              </a:buClr>
-            </a:pPr>
-            <a:r>
-              <a:rPr lang="pt-BR" dirty="0">
-                <a:latin typeface="Roboto Thin" panose="02000000000000000000" pitchFamily="2" charset="0"/>
-                <a:ea typeface="Roboto Thin" panose="02000000000000000000" pitchFamily="2" charset="0"/>
-              </a:rPr>
-              <a:t>https://dev.mysql.com/doc</a:t>
-            </a:r>
-          </a:p>
-        </p:txBody>
-      </p:sp>
-    </p:spTree>
-    <p:extLst>
-      <p:ext uri="{BB962C8B-B14F-4D97-AF65-F5344CB8AC3E}">
-        <p14:creationId xmlns:p14="http://schemas.microsoft.com/office/powerpoint/2010/main" val="1493552308"/>
-      </p:ext>
-    </p:extLst>
-  </p:cSld>
-  <p:clrMapOvr>
-    <a:masterClrMapping/>
-  </p:clrMapOvr>
-</p:sld>
-</file>
-
 <file path=ppt/slides/slide2.xml><?xml version="1.0" encoding="utf-8"?>
 <p:sld xmlns:a="http://schemas.openxmlformats.org/drawingml/2006/main" xmlns:r="http://schemas.openxmlformats.org/officeDocument/2006/relationships" xmlns:p="http://schemas.openxmlformats.org/presentationml/2006/main">
   <p:cSld>
@@ -3776,548 +3515,6 @@
       </p:grpSpPr>
       <p:sp>
         <p:nvSpPr>
-          <p:cNvPr id="2" name="Título 1"/>
-          <p:cNvSpPr>
-            <a:spLocks noGrp="1"/>
-          </p:cNvSpPr>
-          <p:nvPr>
-            <p:ph type="title"/>
-          </p:nvPr>
-        </p:nvSpPr>
-        <p:spPr>
-          <a:xfrm>
-            <a:off x="0" y="1"/>
-            <a:ext cx="12192000" cy="1030310"/>
-          </a:xfrm>
-          <a:solidFill>
-            <a:srgbClr val="007EA6"/>
-          </a:solidFill>
-        </p:spPr>
-        <p:txBody>
-          <a:bodyPr/>
-          <a:lstStyle/>
-          <a:p>
-            <a:r>
-              <a:rPr lang="pt-BR" dirty="0">
-                <a:solidFill>
-                  <a:schemeClr val="bg1"/>
-                </a:solidFill>
-                <a:latin typeface="Roboto Thin" panose="02000000000000000000" pitchFamily="2" charset="0"/>
-                <a:ea typeface="Roboto Thin" panose="02000000000000000000" pitchFamily="2" charset="0"/>
-              </a:rPr>
-              <a:t>NullBank</a:t>
-            </a:r>
-          </a:p>
-        </p:txBody>
-      </p:sp>
-      <p:sp>
-        <p:nvSpPr>
-          <p:cNvPr id="6" name="CaixaDeTexto 5"/>
-          <p:cNvSpPr txBox="1"/>
-          <p:nvPr/>
-        </p:nvSpPr>
-        <p:spPr>
-          <a:xfrm>
-            <a:off x="4417455" y="1878126"/>
-            <a:ext cx="6941711" cy="830997"/>
-          </a:xfrm>
-          <a:prstGeom prst="rect">
-            <a:avLst/>
-          </a:prstGeom>
-          <a:noFill/>
-        </p:spPr>
-        <p:txBody>
-          <a:bodyPr wrap="square" rtlCol="0">
-            <a:spAutoFit/>
-          </a:bodyPr>
-          <a:lstStyle/>
-          <a:p>
-            <a:pPr marL="342900" indent="-342900">
-              <a:buClr>
-                <a:srgbClr val="007EA6"/>
-              </a:buClr>
-              <a:buFont typeface="Arial" panose="020B0604020202020204" pitchFamily="34" charset="0"/>
-              <a:buChar char="•"/>
-            </a:pPr>
-            <a:endParaRPr lang="pt-BR" sz="2400" dirty="0">
-              <a:solidFill>
-                <a:srgbClr val="001173"/>
-              </a:solidFill>
-              <a:latin typeface="Roboto Thin" panose="02000000000000000000" pitchFamily="2" charset="0"/>
-              <a:ea typeface="Roboto Thin" panose="02000000000000000000" pitchFamily="2" charset="0"/>
-            </a:endParaRPr>
-          </a:p>
-          <a:p>
-            <a:pPr marL="342900" indent="-342900">
-              <a:buClr>
-                <a:srgbClr val="007EA6"/>
-              </a:buClr>
-              <a:buFont typeface="Arial" panose="020B0604020202020204" pitchFamily="34" charset="0"/>
-              <a:buChar char="•"/>
-            </a:pPr>
-            <a:endParaRPr lang="pt-BR" sz="2400" dirty="0">
-              <a:solidFill>
-                <a:srgbClr val="001173"/>
-              </a:solidFill>
-              <a:latin typeface="Roboto Thin" panose="02000000000000000000" pitchFamily="2" charset="0"/>
-              <a:ea typeface="Roboto Thin" panose="02000000000000000000" pitchFamily="2" charset="0"/>
-            </a:endParaRPr>
-          </a:p>
-        </p:txBody>
-      </p:sp>
-      <p:sp>
-        <p:nvSpPr>
-          <p:cNvPr id="9" name="Espaço Reservado para Conteúdo 8"/>
-          <p:cNvSpPr>
-            <a:spLocks noGrp="1"/>
-          </p:cNvSpPr>
-          <p:nvPr>
-            <p:ph idx="1"/>
-          </p:nvPr>
-        </p:nvSpPr>
-        <p:spPr/>
-        <p:txBody>
-          <a:bodyPr/>
-          <a:lstStyle/>
-          <a:p>
-            <a:endParaRPr lang="pt-BR"/>
-          </a:p>
-        </p:txBody>
-      </p:sp>
-    </p:spTree>
-    <p:extLst>
-      <p:ext uri="{BB962C8B-B14F-4D97-AF65-F5344CB8AC3E}">
-        <p14:creationId xmlns:p14="http://schemas.microsoft.com/office/powerpoint/2010/main" val="1659387329"/>
-      </p:ext>
-    </p:extLst>
-  </p:cSld>
-  <p:clrMapOvr>
-    <a:masterClrMapping/>
-  </p:clrMapOvr>
-</p:sld>
-</file>
-
-<file path=ppt/slides/slide5.xml><?xml version="1.0" encoding="utf-8"?>
-<p:sld xmlns:a="http://schemas.openxmlformats.org/drawingml/2006/main" xmlns:r="http://schemas.openxmlformats.org/officeDocument/2006/relationships" xmlns:p="http://schemas.openxmlformats.org/presentationml/2006/main">
-  <p:cSld>
-    <p:spTree>
-      <p:nvGrpSpPr>
-        <p:cNvPr id="1" name=""/>
-        <p:cNvGrpSpPr/>
-        <p:nvPr/>
-      </p:nvGrpSpPr>
-      <p:grpSpPr>
-        <a:xfrm>
-          <a:off x="0" y="0"/>
-          <a:ext cx="0" cy="0"/>
-          <a:chOff x="0" y="0"/>
-          <a:chExt cx="0" cy="0"/>
-        </a:xfrm>
-      </p:grpSpPr>
-      <p:sp>
-        <p:nvSpPr>
-          <p:cNvPr id="2" name="Título 1"/>
-          <p:cNvSpPr>
-            <a:spLocks noGrp="1"/>
-          </p:cNvSpPr>
-          <p:nvPr>
-            <p:ph type="title"/>
-          </p:nvPr>
-        </p:nvSpPr>
-        <p:spPr>
-          <a:xfrm>
-            <a:off x="0" y="1"/>
-            <a:ext cx="12192000" cy="1030310"/>
-          </a:xfrm>
-          <a:solidFill>
-            <a:srgbClr val="007EA6"/>
-          </a:solidFill>
-        </p:spPr>
-        <p:txBody>
-          <a:bodyPr/>
-          <a:lstStyle/>
-          <a:p>
-            <a:r>
-              <a:rPr lang="pt-BR" dirty="0">
-                <a:solidFill>
-                  <a:schemeClr val="bg1"/>
-                </a:solidFill>
-                <a:latin typeface="Roboto Thin" panose="02000000000000000000" pitchFamily="2" charset="0"/>
-                <a:ea typeface="Roboto Thin" panose="02000000000000000000" pitchFamily="2" charset="0"/>
-              </a:rPr>
-              <a:t>NullBank</a:t>
-            </a:r>
-          </a:p>
-        </p:txBody>
-      </p:sp>
-      <p:sp>
-        <p:nvSpPr>
-          <p:cNvPr id="5" name="CaixaDeTexto 4"/>
-          <p:cNvSpPr txBox="1"/>
-          <p:nvPr/>
-        </p:nvSpPr>
-        <p:spPr>
-          <a:xfrm>
-            <a:off x="1054781" y="4332621"/>
-            <a:ext cx="2699410" cy="461665"/>
-          </a:xfrm>
-          <a:prstGeom prst="rect">
-            <a:avLst/>
-          </a:prstGeom>
-          <a:noFill/>
-        </p:spPr>
-        <p:txBody>
-          <a:bodyPr wrap="square" rtlCol="0">
-            <a:spAutoFit/>
-          </a:bodyPr>
-          <a:lstStyle/>
-          <a:p>
-            <a:r>
-              <a:rPr lang="pt-BR" sz="2400" dirty="0">
-                <a:latin typeface="Roboto Thin" panose="02000000000000000000" pitchFamily="2" charset="0"/>
-                <a:ea typeface="Roboto Thin" panose="02000000000000000000" pitchFamily="2" charset="0"/>
-              </a:rPr>
-              <a:t>Sistema Bancário</a:t>
-            </a:r>
-            <a:r>
-              <a:rPr lang="pt-BR" dirty="0">
-                <a:latin typeface="Roboto Thin" panose="02000000000000000000" pitchFamily="2" charset="0"/>
-                <a:ea typeface="Roboto Thin" panose="02000000000000000000" pitchFamily="2" charset="0"/>
-              </a:rPr>
-              <a:t>.</a:t>
-            </a:r>
-          </a:p>
-        </p:txBody>
-      </p:sp>
-      <p:sp>
-        <p:nvSpPr>
-          <p:cNvPr id="6" name="CaixaDeTexto 5"/>
-          <p:cNvSpPr txBox="1"/>
-          <p:nvPr/>
-        </p:nvSpPr>
-        <p:spPr>
-          <a:xfrm>
-            <a:off x="4417455" y="1878126"/>
-            <a:ext cx="6941711" cy="830997"/>
-          </a:xfrm>
-          <a:prstGeom prst="rect">
-            <a:avLst/>
-          </a:prstGeom>
-          <a:noFill/>
-        </p:spPr>
-        <p:txBody>
-          <a:bodyPr wrap="square" rtlCol="0">
-            <a:spAutoFit/>
-          </a:bodyPr>
-          <a:lstStyle/>
-          <a:p>
-            <a:pPr marL="342900" indent="-342900">
-              <a:buClr>
-                <a:srgbClr val="007EA6"/>
-              </a:buClr>
-              <a:buFont typeface="Arial" panose="020B0604020202020204" pitchFamily="34" charset="0"/>
-              <a:buChar char="•"/>
-            </a:pPr>
-            <a:endParaRPr lang="pt-BR" sz="2400" dirty="0">
-              <a:solidFill>
-                <a:srgbClr val="001173"/>
-              </a:solidFill>
-              <a:latin typeface="Roboto Thin" panose="02000000000000000000" pitchFamily="2" charset="0"/>
-              <a:ea typeface="Roboto Thin" panose="02000000000000000000" pitchFamily="2" charset="0"/>
-            </a:endParaRPr>
-          </a:p>
-          <a:p>
-            <a:pPr marL="342900" indent="-342900">
-              <a:buClr>
-                <a:srgbClr val="007EA6"/>
-              </a:buClr>
-              <a:buFont typeface="Arial" panose="020B0604020202020204" pitchFamily="34" charset="0"/>
-              <a:buChar char="•"/>
-            </a:pPr>
-            <a:endParaRPr lang="pt-BR" sz="2400" dirty="0">
-              <a:solidFill>
-                <a:srgbClr val="001173"/>
-              </a:solidFill>
-              <a:latin typeface="Roboto Thin" panose="02000000000000000000" pitchFamily="2" charset="0"/>
-              <a:ea typeface="Roboto Thin" panose="02000000000000000000" pitchFamily="2" charset="0"/>
-            </a:endParaRPr>
-          </a:p>
-        </p:txBody>
-      </p:sp>
-      <p:sp>
-        <p:nvSpPr>
-          <p:cNvPr id="3" name="Espaço Reservado para Conteúdo 2"/>
-          <p:cNvSpPr>
-            <a:spLocks noGrp="1"/>
-          </p:cNvSpPr>
-          <p:nvPr>
-            <p:ph idx="1"/>
-          </p:nvPr>
-        </p:nvSpPr>
-        <p:spPr/>
-        <p:txBody>
-          <a:bodyPr/>
-          <a:lstStyle/>
-          <a:p>
-            <a:r>
-              <a:rPr lang="pt-BR" dirty="0"/>
-              <a:t>Aqui será inserido </a:t>
-            </a:r>
-            <a:r>
-              <a:rPr lang="pt-BR" dirty="0" err="1"/>
-              <a:t>prints</a:t>
-            </a:r>
-            <a:r>
-              <a:rPr lang="pt-BR" dirty="0"/>
-              <a:t> das telas</a:t>
-            </a:r>
-          </a:p>
-          <a:p>
-            <a:r>
-              <a:rPr lang="pt-BR" dirty="0"/>
-              <a:t>Aqui e nos </a:t>
-            </a:r>
-            <a:r>
-              <a:rPr lang="pt-BR"/>
-              <a:t>próximo slides.</a:t>
-            </a:r>
-            <a:endParaRPr lang="pt-BR" dirty="0"/>
-          </a:p>
-        </p:txBody>
-      </p:sp>
-    </p:spTree>
-    <p:extLst>
-      <p:ext uri="{BB962C8B-B14F-4D97-AF65-F5344CB8AC3E}">
-        <p14:creationId xmlns:p14="http://schemas.microsoft.com/office/powerpoint/2010/main" val="631037317"/>
-      </p:ext>
-    </p:extLst>
-  </p:cSld>
-  <p:clrMapOvr>
-    <a:masterClrMapping/>
-  </p:clrMapOvr>
-</p:sld>
-</file>
-
-<file path=ppt/slides/slide6.xml><?xml version="1.0" encoding="utf-8"?>
-<p:sld xmlns:a="http://schemas.openxmlformats.org/drawingml/2006/main" xmlns:r="http://schemas.openxmlformats.org/officeDocument/2006/relationships" xmlns:p="http://schemas.openxmlformats.org/presentationml/2006/main">
-  <p:cSld>
-    <p:spTree>
-      <p:nvGrpSpPr>
-        <p:cNvPr id="1" name=""/>
-        <p:cNvGrpSpPr/>
-        <p:nvPr/>
-      </p:nvGrpSpPr>
-      <p:grpSpPr>
-        <a:xfrm>
-          <a:off x="0" y="0"/>
-          <a:ext cx="0" cy="0"/>
-          <a:chOff x="0" y="0"/>
-          <a:chExt cx="0" cy="0"/>
-        </a:xfrm>
-      </p:grpSpPr>
-      <p:sp>
-        <p:nvSpPr>
-          <p:cNvPr id="2" name="Título 1"/>
-          <p:cNvSpPr>
-            <a:spLocks noGrp="1"/>
-          </p:cNvSpPr>
-          <p:nvPr>
-            <p:ph type="title"/>
-          </p:nvPr>
-        </p:nvSpPr>
-        <p:spPr>
-          <a:xfrm>
-            <a:off x="0" y="1"/>
-            <a:ext cx="12192000" cy="1030310"/>
-          </a:xfrm>
-          <a:solidFill>
-            <a:srgbClr val="007EA6"/>
-          </a:solidFill>
-        </p:spPr>
-        <p:txBody>
-          <a:bodyPr/>
-          <a:lstStyle/>
-          <a:p>
-            <a:r>
-              <a:rPr lang="pt-BR" dirty="0">
-                <a:solidFill>
-                  <a:schemeClr val="bg1"/>
-                </a:solidFill>
-                <a:latin typeface="Roboto Thin" panose="02000000000000000000" pitchFamily="2" charset="0"/>
-                <a:ea typeface="Roboto Thin" panose="02000000000000000000" pitchFamily="2" charset="0"/>
-              </a:rPr>
-              <a:t>NullBank</a:t>
-            </a:r>
-          </a:p>
-        </p:txBody>
-      </p:sp>
-      <p:sp>
-        <p:nvSpPr>
-          <p:cNvPr id="5" name="CaixaDeTexto 4"/>
-          <p:cNvSpPr txBox="1"/>
-          <p:nvPr/>
-        </p:nvSpPr>
-        <p:spPr>
-          <a:xfrm>
-            <a:off x="1054781" y="4332621"/>
-            <a:ext cx="2699410" cy="461665"/>
-          </a:xfrm>
-          <a:prstGeom prst="rect">
-            <a:avLst/>
-          </a:prstGeom>
-          <a:noFill/>
-        </p:spPr>
-        <p:txBody>
-          <a:bodyPr wrap="square" rtlCol="0">
-            <a:spAutoFit/>
-          </a:bodyPr>
-          <a:lstStyle/>
-          <a:p>
-            <a:r>
-              <a:rPr lang="pt-BR" sz="2400" dirty="0">
-                <a:latin typeface="Roboto Thin" panose="02000000000000000000" pitchFamily="2" charset="0"/>
-                <a:ea typeface="Roboto Thin" panose="02000000000000000000" pitchFamily="2" charset="0"/>
-              </a:rPr>
-              <a:t>Sistema Bancário</a:t>
-            </a:r>
-            <a:r>
-              <a:rPr lang="pt-BR" dirty="0">
-                <a:latin typeface="Roboto Thin" panose="02000000000000000000" pitchFamily="2" charset="0"/>
-                <a:ea typeface="Roboto Thin" panose="02000000000000000000" pitchFamily="2" charset="0"/>
-              </a:rPr>
-              <a:t>.</a:t>
-            </a:r>
-          </a:p>
-        </p:txBody>
-      </p:sp>
-      <p:sp>
-        <p:nvSpPr>
-          <p:cNvPr id="6" name="CaixaDeTexto 5"/>
-          <p:cNvSpPr txBox="1"/>
-          <p:nvPr/>
-        </p:nvSpPr>
-        <p:spPr>
-          <a:xfrm>
-            <a:off x="4417455" y="1878126"/>
-            <a:ext cx="6941711" cy="830997"/>
-          </a:xfrm>
-          <a:prstGeom prst="rect">
-            <a:avLst/>
-          </a:prstGeom>
-          <a:noFill/>
-        </p:spPr>
-        <p:txBody>
-          <a:bodyPr wrap="square" rtlCol="0">
-            <a:spAutoFit/>
-          </a:bodyPr>
-          <a:lstStyle/>
-          <a:p>
-            <a:pPr marL="342900" indent="-342900">
-              <a:buClr>
-                <a:srgbClr val="007EA6"/>
-              </a:buClr>
-              <a:buFont typeface="Arial" panose="020B0604020202020204" pitchFamily="34" charset="0"/>
-              <a:buChar char="•"/>
-            </a:pPr>
-            <a:endParaRPr lang="pt-BR" sz="2400" dirty="0">
-              <a:solidFill>
-                <a:srgbClr val="001173"/>
-              </a:solidFill>
-              <a:latin typeface="Roboto Thin" panose="02000000000000000000" pitchFamily="2" charset="0"/>
-              <a:ea typeface="Roboto Thin" panose="02000000000000000000" pitchFamily="2" charset="0"/>
-            </a:endParaRPr>
-          </a:p>
-          <a:p>
-            <a:pPr marL="342900" indent="-342900">
-              <a:buClr>
-                <a:srgbClr val="007EA6"/>
-              </a:buClr>
-              <a:buFont typeface="Arial" panose="020B0604020202020204" pitchFamily="34" charset="0"/>
-              <a:buChar char="•"/>
-            </a:pPr>
-            <a:endParaRPr lang="pt-BR" sz="2400" dirty="0">
-              <a:solidFill>
-                <a:srgbClr val="001173"/>
-              </a:solidFill>
-              <a:latin typeface="Roboto Thin" panose="02000000000000000000" pitchFamily="2" charset="0"/>
-              <a:ea typeface="Roboto Thin" panose="02000000000000000000" pitchFamily="2" charset="0"/>
-            </a:endParaRPr>
-          </a:p>
-        </p:txBody>
-      </p:sp>
-      <p:sp>
-        <p:nvSpPr>
-          <p:cNvPr id="3" name="Espaço Reservado para Conteúdo 2"/>
-          <p:cNvSpPr>
-            <a:spLocks noGrp="1"/>
-          </p:cNvSpPr>
-          <p:nvPr>
-            <p:ph idx="1"/>
-          </p:nvPr>
-        </p:nvSpPr>
-        <p:spPr/>
-        <p:txBody>
-          <a:bodyPr/>
-          <a:lstStyle/>
-          <a:p>
-            <a:r>
-              <a:rPr lang="pt-BR" dirty="0"/>
-              <a:t>Aqui será inserido </a:t>
-            </a:r>
-            <a:r>
-              <a:rPr lang="pt-BR" dirty="0" err="1"/>
-              <a:t>prints</a:t>
-            </a:r>
-            <a:r>
-              <a:rPr lang="pt-BR" dirty="0"/>
-              <a:t> das telas</a:t>
-            </a:r>
-          </a:p>
-          <a:p>
-            <a:r>
-              <a:rPr lang="pt-BR" dirty="0"/>
-              <a:t>Aqui e nos </a:t>
-            </a:r>
-            <a:r>
-              <a:rPr lang="pt-BR"/>
-              <a:t>próximo slides.</a:t>
-            </a:r>
-            <a:endParaRPr lang="pt-BR" dirty="0"/>
-          </a:p>
-        </p:txBody>
-      </p:sp>
-    </p:spTree>
-    <p:extLst>
-      <p:ext uri="{BB962C8B-B14F-4D97-AF65-F5344CB8AC3E}">
-        <p14:creationId xmlns:p14="http://schemas.microsoft.com/office/powerpoint/2010/main" val="3110256104"/>
-      </p:ext>
-    </p:extLst>
-  </p:cSld>
-  <p:clrMapOvr>
-    <a:masterClrMapping/>
-  </p:clrMapOvr>
-</p:sld>
-</file>
-
-<file path=ppt/slides/slide7.xml><?xml version="1.0" encoding="utf-8"?>
-<p:sld xmlns:a="http://schemas.openxmlformats.org/drawingml/2006/main" xmlns:r="http://schemas.openxmlformats.org/officeDocument/2006/relationships" xmlns:p="http://schemas.openxmlformats.org/presentationml/2006/main">
-  <p:cSld>
-    <p:spTree>
-      <p:nvGrpSpPr>
-        <p:cNvPr id="1" name=""/>
-        <p:cNvGrpSpPr/>
-        <p:nvPr/>
-      </p:nvGrpSpPr>
-      <p:grpSpPr>
-        <a:xfrm>
-          <a:off x="0" y="0"/>
-          <a:ext cx="0" cy="0"/>
-          <a:chOff x="0" y="0"/>
-          <a:chExt cx="0" cy="0"/>
-        </a:xfrm>
-      </p:grpSpPr>
-      <p:sp>
-        <p:nvSpPr>
           <p:cNvPr id="3" name="Espaço Reservado para Conteúdo 2"/>
           <p:cNvSpPr>
             <a:spLocks noGrp="1"/>
@@ -4402,7 +3599,7 @@
 </p:sld>
 </file>
 
-<file path=ppt/slides/slide8.xml><?xml version="1.0" encoding="utf-8"?>
+<file path=ppt/slides/slide5.xml><?xml version="1.0" encoding="utf-8"?>
 <p:sld xmlns:a="http://schemas.openxmlformats.org/drawingml/2006/main" xmlns:r="http://schemas.openxmlformats.org/officeDocument/2006/relationships" xmlns:p="http://schemas.openxmlformats.org/presentationml/2006/main">
   <p:cSld>
     <p:spTree>
@@ -4467,7 +3664,7 @@
         </p:nvSpPr>
         <p:spPr/>
         <p:txBody>
-          <a:bodyPr/>
+          <a:bodyPr anchor="ctr"/>
           <a:lstStyle/>
           <a:p>
             <a:pPr>
@@ -4494,7 +3691,7 @@
                 <a:latin typeface="Roboto Thin" panose="02000000000000000000" pitchFamily="2" charset="0"/>
                 <a:ea typeface="Roboto Thin" panose="02000000000000000000" pitchFamily="2" charset="0"/>
               </a:rPr>
-              <a:t>MySQL Workbench  6.3 - modelagem;</a:t>
+              <a:t>MySQL Workbench  6.3.9;</a:t>
             </a:r>
           </a:p>
           <a:p>
@@ -4508,7 +3705,7 @@
                 <a:latin typeface="Roboto Thin" panose="02000000000000000000" pitchFamily="2" charset="0"/>
                 <a:ea typeface="Roboto Thin" panose="02000000000000000000" pitchFamily="2" charset="0"/>
               </a:rPr>
-              <a:t>MySQL Server 5.7.19 - h.</a:t>
+              <a:t>MySQL Server 5.7.19 .</a:t>
             </a:r>
           </a:p>
           <a:p>
@@ -4548,7 +3745,7 @@
                 <a:latin typeface="Roboto Thin" panose="02000000000000000000" pitchFamily="2" charset="0"/>
                 <a:ea typeface="Roboto Thin" panose="02000000000000000000" pitchFamily="2" charset="0"/>
               </a:rPr>
-              <a:t>HTML 5;</a:t>
+              <a:t>HTML5;</a:t>
             </a:r>
           </a:p>
           <a:p>
@@ -4562,7 +3759,7 @@
                 <a:latin typeface="Roboto Thin" panose="02000000000000000000" pitchFamily="2" charset="0"/>
                 <a:ea typeface="Roboto Thin" panose="02000000000000000000" pitchFamily="2" charset="0"/>
               </a:rPr>
-              <a:t>CSS 3 - </a:t>
+              <a:t>CSS3 - </a:t>
             </a:r>
             <a:r>
               <a:rPr lang="pt-BR" dirty="0" err="1">
@@ -4632,7 +3829,21 @@
                 <a:latin typeface="Roboto Thin" panose="02000000000000000000" pitchFamily="2" charset="0"/>
                 <a:ea typeface="Roboto Thin" panose="02000000000000000000" pitchFamily="2" charset="0"/>
               </a:rPr>
-              <a:t> 6.11.5.</a:t>
+              <a:t> 6.11.5;</a:t>
+            </a:r>
+          </a:p>
+          <a:p>
+            <a:pPr lvl="1">
+              <a:buClr>
+                <a:srgbClr val="001173"/>
+              </a:buClr>
+            </a:pPr>
+            <a:r>
+              <a:rPr lang="pt-BR" dirty="0">
+                <a:latin typeface="Roboto Thin" panose="02000000000000000000" pitchFamily="2" charset="0"/>
+                <a:ea typeface="Roboto Thin" panose="02000000000000000000" pitchFamily="2" charset="0"/>
+              </a:rPr>
+              <a:t>NPM MySQL 2.15.0 - Conector JS para MySQL.</a:t>
             </a:r>
           </a:p>
         </p:txBody>
@@ -4650,7 +3861,7 @@
 </p:sld>
 </file>
 
-<file path=ppt/slides/slide9.xml><?xml version="1.0" encoding="utf-8"?>
+<file path=ppt/slides/slide6.xml><?xml version="1.0" encoding="utf-8"?>
 <p:sld xmlns:a="http://schemas.openxmlformats.org/drawingml/2006/main" xmlns:r="http://schemas.openxmlformats.org/officeDocument/2006/relationships" xmlns:p="http://schemas.openxmlformats.org/presentationml/2006/main">
   <p:cSld>
     <p:spTree>
@@ -4744,6 +3955,172 @@
     <p:extLst>
       <p:ext uri="{BB962C8B-B14F-4D97-AF65-F5344CB8AC3E}">
         <p14:creationId xmlns:p14="http://schemas.microsoft.com/office/powerpoint/2010/main" val="3548836521"/>
+      </p:ext>
+    </p:extLst>
+  </p:cSld>
+  <p:clrMapOvr>
+    <a:masterClrMapping/>
+  </p:clrMapOvr>
+</p:sld>
+</file>
+
+<file path=ppt/slides/slide7.xml><?xml version="1.0" encoding="utf-8"?>
+<p:sld xmlns:a="http://schemas.openxmlformats.org/drawingml/2006/main" xmlns:r="http://schemas.openxmlformats.org/officeDocument/2006/relationships" xmlns:p="http://schemas.openxmlformats.org/presentationml/2006/main">
+  <p:cSld>
+    <p:spTree>
+      <p:nvGrpSpPr>
+        <p:cNvPr id="1" name=""/>
+        <p:cNvGrpSpPr/>
+        <p:nvPr/>
+      </p:nvGrpSpPr>
+      <p:grpSpPr>
+        <a:xfrm>
+          <a:off x="0" y="0"/>
+          <a:ext cx="0" cy="0"/>
+          <a:chOff x="0" y="0"/>
+          <a:chExt cx="0" cy="0"/>
+        </a:xfrm>
+      </p:grpSpPr>
+      <p:sp>
+        <p:nvSpPr>
+          <p:cNvPr id="2" name="Título 1"/>
+          <p:cNvSpPr>
+            <a:spLocks noGrp="1"/>
+          </p:cNvSpPr>
+          <p:nvPr>
+            <p:ph type="title"/>
+          </p:nvPr>
+        </p:nvSpPr>
+        <p:spPr>
+          <a:xfrm>
+            <a:off x="0" y="1"/>
+            <a:ext cx="12192000" cy="1030310"/>
+          </a:xfrm>
+          <a:solidFill>
+            <a:srgbClr val="007EA6"/>
+          </a:solidFill>
+        </p:spPr>
+        <p:txBody>
+          <a:bodyPr/>
+          <a:lstStyle/>
+          <a:p>
+            <a:r>
+              <a:rPr lang="pt-BR" dirty="0">
+                <a:solidFill>
+                  <a:schemeClr val="bg1"/>
+                </a:solidFill>
+                <a:latin typeface="Roboto Thin" panose="02000000000000000000" pitchFamily="2" charset="0"/>
+                <a:ea typeface="Roboto Thin" panose="02000000000000000000" pitchFamily="2" charset="0"/>
+              </a:rPr>
+              <a:t>Referências</a:t>
+            </a:r>
+          </a:p>
+        </p:txBody>
+      </p:sp>
+      <p:sp>
+        <p:nvSpPr>
+          <p:cNvPr id="3" name="Espaço Reservado para Conteúdo 2"/>
+          <p:cNvSpPr>
+            <a:spLocks noGrp="1"/>
+          </p:cNvSpPr>
+          <p:nvPr>
+            <p:ph idx="1"/>
+          </p:nvPr>
+        </p:nvSpPr>
+        <p:spPr/>
+        <p:txBody>
+          <a:bodyPr anchor="ctr"/>
+          <a:lstStyle/>
+          <a:p>
+            <a:pPr>
+              <a:buClr>
+                <a:srgbClr val="001173"/>
+              </a:buClr>
+            </a:pPr>
+            <a:r>
+              <a:rPr lang="pt-BR" dirty="0">
+                <a:latin typeface="Roboto Thin" panose="02000000000000000000" pitchFamily="2" charset="0"/>
+                <a:ea typeface="Roboto Thin" panose="02000000000000000000" pitchFamily="2" charset="0"/>
+              </a:rPr>
+              <a:t>https://electronjs.org/docs/api</a:t>
+            </a:r>
+          </a:p>
+          <a:p>
+            <a:pPr>
+              <a:buClr>
+                <a:srgbClr val="001173"/>
+              </a:buClr>
+            </a:pPr>
+            <a:r>
+              <a:rPr lang="pt-BR" dirty="0">
+                <a:latin typeface="Roboto Thin" panose="02000000000000000000" pitchFamily="2" charset="0"/>
+                <a:ea typeface="Roboto Thin" panose="02000000000000000000" pitchFamily="2" charset="0"/>
+              </a:rPr>
+              <a:t>https://getbootstrap.com/docs/4.0/getting-started/introduction</a:t>
+            </a:r>
+          </a:p>
+          <a:p>
+            <a:pPr>
+              <a:buClr>
+                <a:srgbClr val="001173"/>
+              </a:buClr>
+            </a:pPr>
+            <a:r>
+              <a:rPr lang="pt-BR" dirty="0">
+                <a:latin typeface="Roboto Thin" panose="02000000000000000000" pitchFamily="2" charset="0"/>
+                <a:ea typeface="Roboto Thin" panose="02000000000000000000" pitchFamily="2" charset="0"/>
+              </a:rPr>
+              <a:t>https://www.npmjs.com/package/mysql</a:t>
+            </a:r>
+          </a:p>
+          <a:p>
+            <a:pPr>
+              <a:buClr>
+                <a:srgbClr val="001173"/>
+              </a:buClr>
+            </a:pPr>
+            <a:r>
+              <a:rPr lang="pt-BR" dirty="0">
+                <a:latin typeface="Roboto Thin" panose="02000000000000000000" pitchFamily="2" charset="0"/>
+                <a:ea typeface="Roboto Thin" panose="02000000000000000000" pitchFamily="2" charset="0"/>
+              </a:rPr>
+              <a:t>https://developer.mozilla.org/pt-BR/docs/Web/JavaScript</a:t>
+            </a:r>
+          </a:p>
+          <a:p>
+            <a:pPr>
+              <a:buClr>
+                <a:srgbClr val="001173"/>
+              </a:buClr>
+            </a:pPr>
+            <a:r>
+              <a:rPr lang="pt-BR" dirty="0">
+                <a:latin typeface="Roboto Thin" panose="02000000000000000000" pitchFamily="2" charset="0"/>
+                <a:ea typeface="Roboto Thin" panose="02000000000000000000" pitchFamily="2" charset="0"/>
+              </a:rPr>
+              <a:t>https://developer.mozilla.org/pt-BR/docs/Web/HTML</a:t>
+            </a:r>
+          </a:p>
+          <a:p>
+            <a:pPr>
+              <a:buClr>
+                <a:srgbClr val="001173"/>
+              </a:buClr>
+            </a:pPr>
+            <a:r>
+              <a:rPr lang="pt-BR" dirty="0">
+                <a:latin typeface="Roboto Thin" panose="02000000000000000000" pitchFamily="2" charset="0"/>
+                <a:ea typeface="Roboto Thin" panose="02000000000000000000" pitchFamily="2" charset="0"/>
+              </a:rPr>
+              <a:t>https://dev.mysql.com/doc</a:t>
+            </a:r>
+          </a:p>
+        </p:txBody>
+      </p:sp>
+    </p:spTree>
+    <p:extLst>
+      <p:ext uri="{BB962C8B-B14F-4D97-AF65-F5344CB8AC3E}">
+        <p14:creationId xmlns:p14="http://schemas.microsoft.com/office/powerpoint/2010/main" val="1493552308"/>
       </p:ext>
     </p:extLst>
   </p:cSld>

</xml_diff>